<commit_message>
cleanup and go-trough first notebooks
</commit_message>
<xml_diff>
--- a/docs/slides.pptx
+++ b/docs/slides.pptx
@@ -5818,7 +5818,7 @@
         </p:nvSpPr>
         <p:spPr>
           <a:xfrm>
-            <a:off x="1293828" y="2315828"/>
+            <a:off x="1284401" y="3324496"/>
             <a:ext cx="8321511" cy="1569660"/>
           </a:xfrm>
           <a:prstGeom prst="rect">
@@ -5878,6 +5878,44 @@
               </a:rPr>
               <a:t>Start Jupyter lab</a:t>
             </a:r>
+          </a:p>
+        </p:txBody>
+      </p:sp>
+      <p:sp>
+        <p:nvSpPr>
+          <p:cNvPr id="8" name="Tekstvak 7">
+            <a:extLst>
+              <a:ext uri="{FF2B5EF4-FFF2-40B4-BE49-F238E27FC236}">
+                <a16:creationId xmlns:a16="http://schemas.microsoft.com/office/drawing/2014/main" id="{4A4FAAEA-BA43-E60C-2E6A-1DD42FB27A20}"/>
+              </a:ext>
+            </a:extLst>
+          </p:cNvPr>
+          <p:cNvSpPr txBox="1"/>
+          <p:nvPr/>
+        </p:nvSpPr>
+        <p:spPr>
+          <a:xfrm>
+            <a:off x="1143000" y="1603693"/>
+            <a:ext cx="6094428" cy="400110"/>
+          </a:xfrm>
+          <a:prstGeom prst="rect">
+            <a:avLst/>
+          </a:prstGeom>
+          <a:noFill/>
+        </p:spPr>
+        <p:txBody>
+          <a:bodyPr wrap="square">
+            <a:spAutoFit/>
+          </a:bodyPr>
+          <a:lstStyle/>
+          <a:p>
+            <a:r>
+              <a:rPr lang="nl-BE" sz="2000" dirty="0">
+                <a:hlinkClick r:id="rId2"/>
+              </a:rPr>
+              <a:t>Instruction steps</a:t>
+            </a:r>
+            <a:endParaRPr lang="nl-BE" sz="2000" dirty="0"/>
           </a:p>
         </p:txBody>
       </p:sp>

</xml_diff>

<commit_message>
Delete solutions for exercises not in repo + clear cell outputs
</commit_message>
<xml_diff>
--- a/docs/slides.pptx
+++ b/docs/slides.pptx
@@ -206,7 +206,7 @@
           <a:p>
             <a:fld id="{B42FCC84-D0D2-484F-A5F4-D96D07BCECAE}" type="datetimeFigureOut">
               <a:rPr lang="nl-BE" smtClean="0"/>
-              <a:t>9/08/2023</a:t>
+              <a:t>16/08/2023</a:t>
             </a:fld>
             <a:endParaRPr lang="nl-BE"/>
           </a:p>
@@ -520,7 +520,34 @@
           <a:p>
             <a:r>
               <a:rPr lang="nl-BE" dirty="0"/>
-              <a:t>Why data science? </a:t>
+              <a:t>Goal of the workshop: </a:t>
+            </a:r>
+          </a:p>
+          <a:p>
+            <a:endParaRPr lang="nl-BE" dirty="0"/>
+          </a:p>
+          <a:p>
+            <a:r>
+              <a:rPr lang="nl-BE" dirty="0"/>
+              <a:t>Learn </a:t>
+            </a:r>
+          </a:p>
+          <a:p>
+            <a:r>
+              <a:rPr lang="nl-BE" dirty="0"/>
+              <a:t>	- how to code more efficiently to process your datasets</a:t>
+            </a:r>
+          </a:p>
+          <a:p>
+            <a:r>
+              <a:rPr lang="nl-BE" dirty="0"/>
+              <a:t>	</a:t>
+            </a:r>
+          </a:p>
+          <a:p>
+            <a:r>
+              <a:rPr lang="nl-BE" dirty="0"/>
+              <a:t>	- visualise location data</a:t>
             </a:r>
           </a:p>
         </p:txBody>
@@ -542,7 +569,7 @@
           <a:p>
             <a:fld id="{CAB2C4AA-7579-3F4B-B91D-C80ABA5FB270}" type="slidenum">
               <a:rPr lang="nl-BE" smtClean="0"/>
-              <a:t>3</a:t>
+              <a:t>2</a:t>
             </a:fld>
             <a:endParaRPr lang="nl-BE"/>
           </a:p>
@@ -551,7 +578,7 @@
     </p:spTree>
     <p:extLst>
       <p:ext uri="{BB962C8B-B14F-4D97-AF65-F5344CB8AC3E}">
-        <p14:creationId xmlns:p14="http://schemas.microsoft.com/office/powerpoint/2010/main" val="1279835229"/>
+        <p14:creationId xmlns:p14="http://schemas.microsoft.com/office/powerpoint/2010/main" val="287365002"/>
       </p:ext>
     </p:extLst>
   </p:cSld>
@@ -605,6 +632,714 @@
           <a:bodyPr/>
           <a:lstStyle/>
           <a:p>
+            <a:r>
+              <a:rPr lang="nl-BE" dirty="0"/>
+              <a:t>Why data science? </a:t>
+            </a:r>
+          </a:p>
+        </p:txBody>
+      </p:sp>
+      <p:sp>
+        <p:nvSpPr>
+          <p:cNvPr id="4" name="Tijdelijke aanduiding voor dianummer 3"/>
+          <p:cNvSpPr>
+            <a:spLocks noGrp="1"/>
+          </p:cNvSpPr>
+          <p:nvPr>
+            <p:ph type="sldNum" sz="quarter" idx="5"/>
+          </p:nvPr>
+        </p:nvSpPr>
+        <p:spPr/>
+        <p:txBody>
+          <a:bodyPr/>
+          <a:lstStyle/>
+          <a:p>
+            <a:fld id="{CAB2C4AA-7579-3F4B-B91D-C80ABA5FB270}" type="slidenum">
+              <a:rPr lang="nl-BE" smtClean="0"/>
+              <a:t>3</a:t>
+            </a:fld>
+            <a:endParaRPr lang="nl-BE"/>
+          </a:p>
+        </p:txBody>
+      </p:sp>
+    </p:spTree>
+    <p:extLst>
+      <p:ext uri="{BB962C8B-B14F-4D97-AF65-F5344CB8AC3E}">
+        <p14:creationId xmlns:p14="http://schemas.microsoft.com/office/powerpoint/2010/main" val="1279835229"/>
+      </p:ext>
+    </p:extLst>
+  </p:cSld>
+  <p:clrMapOvr>
+    <a:masterClrMapping/>
+  </p:clrMapOvr>
+</p:notes>
+</file>
+
+<file path=ppt/notesSlides/notesSlide3.xml><?xml version="1.0" encoding="utf-8"?>
+<p:notes xmlns:a="http://schemas.openxmlformats.org/drawingml/2006/main" xmlns:r="http://schemas.openxmlformats.org/officeDocument/2006/relationships" xmlns:p="http://schemas.openxmlformats.org/presentationml/2006/main">
+  <p:cSld>
+    <p:spTree>
+      <p:nvGrpSpPr>
+        <p:cNvPr id="1" name=""/>
+        <p:cNvGrpSpPr/>
+        <p:nvPr/>
+      </p:nvGrpSpPr>
+      <p:grpSpPr>
+        <a:xfrm>
+          <a:off x="0" y="0"/>
+          <a:ext cx="0" cy="0"/>
+          <a:chOff x="0" y="0"/>
+          <a:chExt cx="0" cy="0"/>
+        </a:xfrm>
+      </p:grpSpPr>
+      <p:sp>
+        <p:nvSpPr>
+          <p:cNvPr id="2" name="Tijdelijke aanduiding voor dia-afbeelding 1"/>
+          <p:cNvSpPr>
+            <a:spLocks noGrp="1" noRot="1" noChangeAspect="1"/>
+          </p:cNvSpPr>
+          <p:nvPr>
+            <p:ph type="sldImg"/>
+          </p:nvPr>
+        </p:nvSpPr>
+        <p:spPr/>
+      </p:sp>
+      <p:sp>
+        <p:nvSpPr>
+          <p:cNvPr id="3" name="Tijdelijke aanduiding voor notities 2"/>
+          <p:cNvSpPr>
+            <a:spLocks noGrp="1"/>
+          </p:cNvSpPr>
+          <p:nvPr>
+            <p:ph type="body" idx="1"/>
+          </p:nvPr>
+        </p:nvSpPr>
+        <p:spPr/>
+        <p:txBody>
+          <a:bodyPr/>
+          <a:lstStyle/>
+          <a:p>
+            <a:r>
+              <a:rPr lang="nl-BE" dirty="0"/>
+              <a:t>Here is an example of the kind of messy data that data scientists frequently encounter. All values appear as dates, but in a different format, like numeric, textual, missing data and placeholders. The challenge here would be to convert all these various formats in a standardized data format. </a:t>
+            </a:r>
+          </a:p>
+          <a:p>
+            <a:endParaRPr lang="nl-BE" dirty="0"/>
+          </a:p>
+          <a:p>
+            <a:endParaRPr lang="nl-BE" dirty="0"/>
+          </a:p>
+        </p:txBody>
+      </p:sp>
+      <p:sp>
+        <p:nvSpPr>
+          <p:cNvPr id="4" name="Tijdelijke aanduiding voor dianummer 3"/>
+          <p:cNvSpPr>
+            <a:spLocks noGrp="1"/>
+          </p:cNvSpPr>
+          <p:nvPr>
+            <p:ph type="sldNum" sz="quarter" idx="5"/>
+          </p:nvPr>
+        </p:nvSpPr>
+        <p:spPr/>
+        <p:txBody>
+          <a:bodyPr/>
+          <a:lstStyle/>
+          <a:p>
+            <a:fld id="{CAB2C4AA-7579-3F4B-B91D-C80ABA5FB270}" type="slidenum">
+              <a:rPr lang="nl-BE" smtClean="0"/>
+              <a:t>4</a:t>
+            </a:fld>
+            <a:endParaRPr lang="nl-BE"/>
+          </a:p>
+        </p:txBody>
+      </p:sp>
+    </p:spTree>
+    <p:extLst>
+      <p:ext uri="{BB962C8B-B14F-4D97-AF65-F5344CB8AC3E}">
+        <p14:creationId xmlns:p14="http://schemas.microsoft.com/office/powerpoint/2010/main" val="2388449214"/>
+      </p:ext>
+    </p:extLst>
+  </p:cSld>
+  <p:clrMapOvr>
+    <a:masterClrMapping/>
+  </p:clrMapOvr>
+</p:notes>
+</file>
+
+<file path=ppt/notesSlides/notesSlide4.xml><?xml version="1.0" encoding="utf-8"?>
+<p:notes xmlns:a="http://schemas.openxmlformats.org/drawingml/2006/main" xmlns:r="http://schemas.openxmlformats.org/officeDocument/2006/relationships" xmlns:p="http://schemas.openxmlformats.org/presentationml/2006/main">
+  <p:cSld>
+    <p:spTree>
+      <p:nvGrpSpPr>
+        <p:cNvPr id="1" name=""/>
+        <p:cNvGrpSpPr/>
+        <p:nvPr/>
+      </p:nvGrpSpPr>
+      <p:grpSpPr>
+        <a:xfrm>
+          <a:off x="0" y="0"/>
+          <a:ext cx="0" cy="0"/>
+          <a:chOff x="0" y="0"/>
+          <a:chExt cx="0" cy="0"/>
+        </a:xfrm>
+      </p:grpSpPr>
+      <p:sp>
+        <p:nvSpPr>
+          <p:cNvPr id="2" name="Tijdelijke aanduiding voor dia-afbeelding 1"/>
+          <p:cNvSpPr>
+            <a:spLocks noGrp="1" noRot="1" noChangeAspect="1"/>
+          </p:cNvSpPr>
+          <p:nvPr>
+            <p:ph type="sldImg"/>
+          </p:nvPr>
+        </p:nvSpPr>
+        <p:spPr/>
+      </p:sp>
+      <p:sp>
+        <p:nvSpPr>
+          <p:cNvPr id="3" name="Tijdelijke aanduiding voor notities 2"/>
+          <p:cNvSpPr>
+            <a:spLocks noGrp="1"/>
+          </p:cNvSpPr>
+          <p:nvPr>
+            <p:ph type="body" idx="1"/>
+          </p:nvPr>
+        </p:nvSpPr>
+        <p:spPr/>
+        <p:txBody>
+          <a:bodyPr/>
+          <a:lstStyle/>
+          <a:p>
+            <a:r>
+              <a:rPr lang="nl-BE" dirty="0"/>
+              <a:t>So you may ask yourself the question how a data scientist spend his time. </a:t>
+            </a:r>
+          </a:p>
+          <a:p>
+            <a:endParaRPr lang="nl-BE" dirty="0"/>
+          </a:p>
+          <a:p>
+            <a:pPr marL="0" marR="0" lvl="0" indent="0" algn="l" defTabSz="914400" rtl="0" eaLnBrk="1" fontAlgn="auto" latinLnBrk="0" hangingPunct="1">
+              <a:lnSpc>
+                <a:spcPct val="100000"/>
+              </a:lnSpc>
+              <a:spcBef>
+                <a:spcPts val="0"/>
+              </a:spcBef>
+              <a:spcAft>
+                <a:spcPts val="0"/>
+              </a:spcAft>
+              <a:buClrTx/>
+              <a:buSzTx/>
+              <a:buFontTx/>
+              <a:buNone/>
+              <a:tabLst/>
+              <a:defRPr/>
+            </a:pPr>
+            <a:r>
+              <a:rPr lang="nl-BE" sz="1800" dirty="0">
+                <a:effectLst/>
+                <a:latin typeface="NimbusRomNo9L"/>
+              </a:rPr>
+              <a:t>In a report published by Forbes [7], data preparation accounts for about 80% of a data scientists role, with 60% of that time spent with the cleaning and organizing of that data for analysis; </a:t>
+            </a:r>
+            <a:endParaRPr lang="nl-BE" dirty="0"/>
+          </a:p>
+          <a:p>
+            <a:endParaRPr lang="nl-BE" dirty="0"/>
+          </a:p>
+        </p:txBody>
+      </p:sp>
+      <p:sp>
+        <p:nvSpPr>
+          <p:cNvPr id="4" name="Tijdelijke aanduiding voor dianummer 3"/>
+          <p:cNvSpPr>
+            <a:spLocks noGrp="1"/>
+          </p:cNvSpPr>
+          <p:nvPr>
+            <p:ph type="sldNum" sz="quarter" idx="5"/>
+          </p:nvPr>
+        </p:nvSpPr>
+        <p:spPr/>
+        <p:txBody>
+          <a:bodyPr/>
+          <a:lstStyle/>
+          <a:p>
+            <a:fld id="{CAB2C4AA-7579-3F4B-B91D-C80ABA5FB270}" type="slidenum">
+              <a:rPr lang="nl-BE" smtClean="0"/>
+              <a:t>5</a:t>
+            </a:fld>
+            <a:endParaRPr lang="nl-BE"/>
+          </a:p>
+        </p:txBody>
+      </p:sp>
+    </p:spTree>
+    <p:extLst>
+      <p:ext uri="{BB962C8B-B14F-4D97-AF65-F5344CB8AC3E}">
+        <p14:creationId xmlns:p14="http://schemas.microsoft.com/office/powerpoint/2010/main" val="3660128403"/>
+      </p:ext>
+    </p:extLst>
+  </p:cSld>
+  <p:clrMapOvr>
+    <a:masterClrMapping/>
+  </p:clrMapOvr>
+</p:notes>
+</file>
+
+<file path=ppt/notesSlides/notesSlide5.xml><?xml version="1.0" encoding="utf-8"?>
+<p:notes xmlns:a="http://schemas.openxmlformats.org/drawingml/2006/main" xmlns:r="http://schemas.openxmlformats.org/officeDocument/2006/relationships" xmlns:p="http://schemas.openxmlformats.org/presentationml/2006/main">
+  <p:cSld>
+    <p:spTree>
+      <p:nvGrpSpPr>
+        <p:cNvPr id="1" name=""/>
+        <p:cNvGrpSpPr/>
+        <p:nvPr/>
+      </p:nvGrpSpPr>
+      <p:grpSpPr>
+        <a:xfrm>
+          <a:off x="0" y="0"/>
+          <a:ext cx="0" cy="0"/>
+          <a:chOff x="0" y="0"/>
+          <a:chExt cx="0" cy="0"/>
+        </a:xfrm>
+      </p:grpSpPr>
+      <p:sp>
+        <p:nvSpPr>
+          <p:cNvPr id="2" name="Tijdelijke aanduiding voor dia-afbeelding 1"/>
+          <p:cNvSpPr>
+            <a:spLocks noGrp="1" noRot="1" noChangeAspect="1"/>
+          </p:cNvSpPr>
+          <p:nvPr>
+            <p:ph type="sldImg"/>
+          </p:nvPr>
+        </p:nvSpPr>
+        <p:spPr/>
+      </p:sp>
+      <p:sp>
+        <p:nvSpPr>
+          <p:cNvPr id="3" name="Tijdelijke aanduiding voor notities 2"/>
+          <p:cNvSpPr>
+            <a:spLocks noGrp="1"/>
+          </p:cNvSpPr>
+          <p:nvPr>
+            <p:ph type="body" idx="1"/>
+          </p:nvPr>
+        </p:nvSpPr>
+        <p:spPr/>
+        <p:txBody>
+          <a:bodyPr/>
+          <a:lstStyle/>
+          <a:p>
+            <a:r>
+              <a:rPr lang="nl-BE" dirty="0"/>
+              <a:t>At thes ime time, 57% of the respondents in the study of Forbes view data preparation as the least enjoyable part of their work</a:t>
+            </a:r>
+          </a:p>
+          <a:p>
+            <a:endParaRPr lang="nl-BE" dirty="0"/>
+          </a:p>
+          <a:p>
+            <a:r>
+              <a:rPr lang="nl-BE" dirty="0"/>
+              <a:t>So, we want to reduce the time spending cleaning and organising data, by coding efficiently and working with the right tools. </a:t>
+            </a:r>
+          </a:p>
+          <a:p>
+            <a:endParaRPr lang="nl-BE" dirty="0"/>
+          </a:p>
+          <a:p>
+            <a:r>
+              <a:rPr lang="nl-BE" dirty="0"/>
+              <a:t>That workshop should be the first step towards it. </a:t>
+            </a:r>
+          </a:p>
+          <a:p>
+            <a:endParaRPr lang="nl-BE" dirty="0"/>
+          </a:p>
+          <a:p>
+            <a:endParaRPr lang="nl-BE" dirty="0"/>
+          </a:p>
+        </p:txBody>
+      </p:sp>
+      <p:sp>
+        <p:nvSpPr>
+          <p:cNvPr id="4" name="Tijdelijke aanduiding voor dianummer 3"/>
+          <p:cNvSpPr>
+            <a:spLocks noGrp="1"/>
+          </p:cNvSpPr>
+          <p:nvPr>
+            <p:ph type="sldNum" sz="quarter" idx="5"/>
+          </p:nvPr>
+        </p:nvSpPr>
+        <p:spPr/>
+        <p:txBody>
+          <a:bodyPr/>
+          <a:lstStyle/>
+          <a:p>
+            <a:fld id="{CAB2C4AA-7579-3F4B-B91D-C80ABA5FB270}" type="slidenum">
+              <a:rPr lang="nl-BE" smtClean="0"/>
+              <a:t>6</a:t>
+            </a:fld>
+            <a:endParaRPr lang="nl-BE"/>
+          </a:p>
+        </p:txBody>
+      </p:sp>
+    </p:spTree>
+    <p:extLst>
+      <p:ext uri="{BB962C8B-B14F-4D97-AF65-F5344CB8AC3E}">
+        <p14:creationId xmlns:p14="http://schemas.microsoft.com/office/powerpoint/2010/main" val="3032249128"/>
+      </p:ext>
+    </p:extLst>
+  </p:cSld>
+  <p:clrMapOvr>
+    <a:masterClrMapping/>
+  </p:clrMapOvr>
+</p:notes>
+</file>
+
+<file path=ppt/notesSlides/notesSlide6.xml><?xml version="1.0" encoding="utf-8"?>
+<p:notes xmlns:a="http://schemas.openxmlformats.org/drawingml/2006/main" xmlns:r="http://schemas.openxmlformats.org/officeDocument/2006/relationships" xmlns:p="http://schemas.openxmlformats.org/presentationml/2006/main">
+  <p:cSld>
+    <p:spTree>
+      <p:nvGrpSpPr>
+        <p:cNvPr id="1" name=""/>
+        <p:cNvGrpSpPr/>
+        <p:nvPr/>
+      </p:nvGrpSpPr>
+      <p:grpSpPr>
+        <a:xfrm>
+          <a:off x="0" y="0"/>
+          <a:ext cx="0" cy="0"/>
+          <a:chOff x="0" y="0"/>
+          <a:chExt cx="0" cy="0"/>
+        </a:xfrm>
+      </p:grpSpPr>
+      <p:sp>
+        <p:nvSpPr>
+          <p:cNvPr id="2" name="Tijdelijke aanduiding voor dia-afbeelding 1"/>
+          <p:cNvSpPr>
+            <a:spLocks noGrp="1" noRot="1" noChangeAspect="1"/>
+          </p:cNvSpPr>
+          <p:nvPr>
+            <p:ph type="sldImg"/>
+          </p:nvPr>
+        </p:nvSpPr>
+        <p:spPr/>
+      </p:sp>
+      <p:sp>
+        <p:nvSpPr>
+          <p:cNvPr id="3" name="Tijdelijke aanduiding voor notities 2"/>
+          <p:cNvSpPr>
+            <a:spLocks noGrp="1"/>
+          </p:cNvSpPr>
+          <p:nvPr>
+            <p:ph type="body" idx="1"/>
+          </p:nvPr>
+        </p:nvSpPr>
+        <p:spPr/>
+        <p:txBody>
+          <a:bodyPr/>
+          <a:lstStyle/>
+          <a:p>
+            <a:r>
+              <a:rPr lang="nl-BE" dirty="0"/>
+              <a:t>I think Python stands out as the </a:t>
+            </a:r>
+            <a:r>
+              <a:rPr lang="nl-BE" b="0" i="0" u="none" strike="noStrike" dirty="0">
+                <a:solidFill>
+                  <a:srgbClr val="374151"/>
+                </a:solidFill>
+                <a:effectLst/>
+                <a:latin typeface="Söhne"/>
+              </a:rPr>
+              <a:t>ideal programming language for data science and processing because it is very versatily and it has a robust ecosystem. </a:t>
+            </a:r>
+          </a:p>
+          <a:p>
+            <a:endParaRPr lang="nl-BE" b="0" i="0" u="none" strike="noStrike" dirty="0">
+              <a:solidFill>
+                <a:srgbClr val="374151"/>
+              </a:solidFill>
+              <a:effectLst/>
+              <a:latin typeface="Söhne"/>
+            </a:endParaRPr>
+          </a:p>
+          <a:p>
+            <a:r>
+              <a:rPr lang="nl-BE" b="0" i="0" u="none" strike="noStrike" dirty="0">
+                <a:solidFill>
+                  <a:srgbClr val="374151"/>
+                </a:solidFill>
+                <a:effectLst/>
+                <a:latin typeface="Söhne"/>
+              </a:rPr>
+              <a:t>It has an intuitive syntax that enables quick development so it is accesibble to both beginners and expert programmers</a:t>
+            </a:r>
+          </a:p>
+          <a:p>
+            <a:endParaRPr lang="nl-BE" b="0" i="0" u="none" strike="noStrike" dirty="0">
+              <a:solidFill>
+                <a:srgbClr val="374151"/>
+              </a:solidFill>
+              <a:effectLst/>
+              <a:latin typeface="Söhne"/>
+            </a:endParaRPr>
+          </a:p>
+          <a:p>
+            <a:r>
+              <a:rPr lang="nl-BE" b="0" i="0" u="none" strike="noStrike" dirty="0">
+                <a:solidFill>
+                  <a:srgbClr val="374151"/>
+                </a:solidFill>
+                <a:effectLst/>
+                <a:latin typeface="Söhne"/>
+              </a:rPr>
+              <a:t>It’s free to use and there is a lot of documentation to find about at the internet, so I think it is the way to go. </a:t>
+            </a:r>
+          </a:p>
+        </p:txBody>
+      </p:sp>
+      <p:sp>
+        <p:nvSpPr>
+          <p:cNvPr id="4" name="Tijdelijke aanduiding voor dianummer 3"/>
+          <p:cNvSpPr>
+            <a:spLocks noGrp="1"/>
+          </p:cNvSpPr>
+          <p:nvPr>
+            <p:ph type="sldNum" sz="quarter" idx="5"/>
+          </p:nvPr>
+        </p:nvSpPr>
+        <p:spPr/>
+        <p:txBody>
+          <a:bodyPr/>
+          <a:lstStyle/>
+          <a:p>
+            <a:fld id="{CAB2C4AA-7579-3F4B-B91D-C80ABA5FB270}" type="slidenum">
+              <a:rPr lang="nl-BE" smtClean="0"/>
+              <a:t>7</a:t>
+            </a:fld>
+            <a:endParaRPr lang="nl-BE"/>
+          </a:p>
+        </p:txBody>
+      </p:sp>
+    </p:spTree>
+    <p:extLst>
+      <p:ext uri="{BB962C8B-B14F-4D97-AF65-F5344CB8AC3E}">
+        <p14:creationId xmlns:p14="http://schemas.microsoft.com/office/powerpoint/2010/main" val="2922513009"/>
+      </p:ext>
+    </p:extLst>
+  </p:cSld>
+  <p:clrMapOvr>
+    <a:masterClrMapping/>
+  </p:clrMapOvr>
+</p:notes>
+</file>
+
+<file path=ppt/notesSlides/notesSlide7.xml><?xml version="1.0" encoding="utf-8"?>
+<p:notes xmlns:a="http://schemas.openxmlformats.org/drawingml/2006/main" xmlns:r="http://schemas.openxmlformats.org/officeDocument/2006/relationships" xmlns:p="http://schemas.openxmlformats.org/presentationml/2006/main">
+  <p:cSld>
+    <p:spTree>
+      <p:nvGrpSpPr>
+        <p:cNvPr id="1" name=""/>
+        <p:cNvGrpSpPr/>
+        <p:nvPr/>
+      </p:nvGrpSpPr>
+      <p:grpSpPr>
+        <a:xfrm>
+          <a:off x="0" y="0"/>
+          <a:ext cx="0" cy="0"/>
+          <a:chOff x="0" y="0"/>
+          <a:chExt cx="0" cy="0"/>
+        </a:xfrm>
+      </p:grpSpPr>
+      <p:sp>
+        <p:nvSpPr>
+          <p:cNvPr id="2" name="Tijdelijke aanduiding voor dia-afbeelding 1"/>
+          <p:cNvSpPr>
+            <a:spLocks noGrp="1" noRot="1" noChangeAspect="1"/>
+          </p:cNvSpPr>
+          <p:nvPr>
+            <p:ph type="sldImg"/>
+          </p:nvPr>
+        </p:nvSpPr>
+        <p:spPr/>
+      </p:sp>
+      <p:sp>
+        <p:nvSpPr>
+          <p:cNvPr id="3" name="Tijdelijke aanduiding voor notities 2"/>
+          <p:cNvSpPr>
+            <a:spLocks noGrp="1"/>
+          </p:cNvSpPr>
+          <p:nvPr>
+            <p:ph type="body" idx="1"/>
+          </p:nvPr>
+        </p:nvSpPr>
+        <p:spPr/>
+        <p:txBody>
+          <a:bodyPr/>
+          <a:lstStyle/>
+          <a:p>
+            <a:r>
+              <a:rPr lang="nl-BE" dirty="0"/>
+              <a:t>This is how the python landscape looks like, it depicts the most used packages in python</a:t>
+            </a:r>
+          </a:p>
+          <a:p>
+            <a:endParaRPr lang="nl-BE" dirty="0"/>
+          </a:p>
+          <a:p>
+            <a:r>
+              <a:rPr lang="nl-BE" dirty="0"/>
+              <a:t>The base layer is the pure python interpreter</a:t>
+            </a:r>
+          </a:p>
+          <a:p>
+            <a:endParaRPr lang="nl-BE" dirty="0"/>
+          </a:p>
+          <a:p>
+            <a:r>
+              <a:rPr lang="nl-BE" dirty="0"/>
+              <a:t>The packages in the layers above increasingly add functions, and depend on the libraries below.</a:t>
+            </a:r>
+          </a:p>
+          <a:p>
+            <a:endParaRPr lang="nl-BE" dirty="0"/>
+          </a:p>
+          <a:p>
+            <a:r>
+              <a:rPr lang="nl-BE" dirty="0"/>
+              <a:t>For example, </a:t>
+            </a:r>
+          </a:p>
+          <a:p>
+            <a:endParaRPr lang="nl-BE" b="1" dirty="0"/>
+          </a:p>
+          <a:p>
+            <a:r>
+              <a:rPr lang="nl-BE" b="1" dirty="0"/>
+              <a:t>	- numpy</a:t>
+            </a:r>
+            <a:r>
+              <a:rPr lang="nl-BE" dirty="0"/>
+              <a:t> is a scientific package to do advanced numerical computations and array operations</a:t>
+            </a:r>
+          </a:p>
+          <a:p>
+            <a:r>
+              <a:rPr lang="nl-BE" dirty="0"/>
+              <a:t>	</a:t>
+            </a:r>
+            <a:r>
+              <a:rPr lang="nl-BE" b="1" dirty="0"/>
+              <a:t>- </a:t>
+            </a:r>
+            <a:r>
+              <a:rPr lang="nl-BE" b="1" i="0" u="none" strike="noStrike" dirty="0">
+                <a:solidFill>
+                  <a:srgbClr val="374151"/>
+                </a:solidFill>
+                <a:effectLst/>
+                <a:latin typeface="Söhne"/>
+              </a:rPr>
+              <a:t>Jupyter </a:t>
+            </a:r>
+            <a:r>
+              <a:rPr lang="nl-BE" b="0" i="0" u="none" strike="noStrike" dirty="0">
+                <a:solidFill>
+                  <a:srgbClr val="374151"/>
+                </a:solidFill>
+                <a:effectLst/>
+                <a:latin typeface="Söhne"/>
+              </a:rPr>
+              <a:t>is a web application that enables interactive and collaborative computing, allowing users to create and share documents containing live code, equations, visualizations, and text across various programming languages.</a:t>
+            </a:r>
+          </a:p>
+          <a:p>
+            <a:r>
+              <a:rPr lang="nl-BE" b="0" i="0" u="none" strike="noStrike" dirty="0">
+                <a:solidFill>
+                  <a:srgbClr val="374151"/>
+                </a:solidFill>
+                <a:effectLst/>
+                <a:latin typeface="Söhne"/>
+              </a:rPr>
+              <a:t>	- </a:t>
+            </a:r>
+            <a:r>
+              <a:rPr lang="nl-BE" b="1" i="0" u="none" strike="noStrike" dirty="0">
+                <a:solidFill>
+                  <a:srgbClr val="374151"/>
+                </a:solidFill>
+                <a:effectLst/>
+                <a:latin typeface="Söhne"/>
+              </a:rPr>
+              <a:t>Pandas </a:t>
+            </a:r>
+            <a:r>
+              <a:rPr lang="nl-BE" b="0" i="0" u="none" strike="noStrike" dirty="0">
+                <a:solidFill>
+                  <a:srgbClr val="374151"/>
+                </a:solidFill>
+                <a:effectLst/>
+                <a:latin typeface="Söhne"/>
+              </a:rPr>
+              <a:t>library</a:t>
+            </a:r>
+            <a:r>
+              <a:rPr lang="nl-BE" b="1" i="0" u="none" strike="noStrike" dirty="0">
+                <a:solidFill>
+                  <a:srgbClr val="374151"/>
+                </a:solidFill>
+                <a:effectLst/>
+                <a:latin typeface="Söhne"/>
+              </a:rPr>
+              <a:t> </a:t>
+            </a:r>
+            <a:r>
+              <a:rPr lang="nl-BE" b="0" i="0" u="none" strike="noStrike" dirty="0">
+                <a:solidFill>
+                  <a:srgbClr val="374151"/>
+                </a:solidFill>
+                <a:effectLst/>
+                <a:latin typeface="Söhne"/>
+              </a:rPr>
+              <a:t>provides</a:t>
+            </a:r>
+            <a:r>
+              <a:rPr lang="nl-BE" b="1" i="0" u="none" strike="noStrike" dirty="0">
+                <a:solidFill>
+                  <a:srgbClr val="374151"/>
+                </a:solidFill>
+                <a:effectLst/>
+                <a:latin typeface="Söhne"/>
+              </a:rPr>
+              <a:t> </a:t>
+            </a:r>
+            <a:r>
+              <a:rPr lang="nl-BE" b="0" i="0" u="none" strike="noStrike" dirty="0">
+                <a:solidFill>
+                  <a:srgbClr val="374151"/>
+                </a:solidFill>
+                <a:effectLst/>
+                <a:latin typeface="Söhne"/>
+              </a:rPr>
+              <a:t>versatile data structures and tools/functions for efficiently manipulating, cleaning, and analyzing structured data, essential for data analysis and preparation.</a:t>
+            </a:r>
+          </a:p>
+          <a:p>
+            <a:r>
+              <a:rPr lang="nl-BE" b="0" i="0" u="none" strike="noStrike" dirty="0">
+                <a:solidFill>
+                  <a:srgbClr val="374151"/>
+                </a:solidFill>
+                <a:effectLst/>
+                <a:latin typeface="Söhne"/>
+              </a:rPr>
+              <a:t>	- In the top layer there are frequently used packages for data visualisation, but also functions to do machine learning (like Keras, Tensforflow) and Computer vision tasks with OpenCV, these are offten dependent on the packages below</a:t>
+            </a:r>
             <a:endParaRPr lang="nl-BE" dirty="0"/>
           </a:p>
         </p:txBody>
@@ -645,7 +1380,7 @@
 </p:notes>
 </file>
 
-<file path=ppt/notesSlides/notesSlide3.xml><?xml version="1.0" encoding="utf-8"?>
+<file path=ppt/notesSlides/notesSlide8.xml><?xml version="1.0" encoding="utf-8"?>
 <p:notes xmlns:a="http://schemas.openxmlformats.org/drawingml/2006/main" xmlns:r="http://schemas.openxmlformats.org/officeDocument/2006/relationships" xmlns:p="http://schemas.openxmlformats.org/presentationml/2006/main">
   <p:cSld>
     <p:spTree>
@@ -983,7 +1718,7 @@
           <a:p>
             <a:fld id="{C764DE79-268F-4C1A-8933-263129D2AF90}" type="datetimeFigureOut">
               <a:rPr lang="en-US" dirty="0"/>
-              <a:t>8/9/23</a:t>
+              <a:t>8/16/23</a:t>
             </a:fld>
             <a:endParaRPr lang="en-US" dirty="0"/>
           </a:p>
@@ -1158,7 +1893,7 @@
           <a:p>
             <a:fld id="{C764DE79-268F-4C1A-8933-263129D2AF90}" type="datetimeFigureOut">
               <a:rPr lang="en-US" dirty="0"/>
-              <a:t>8/9/23</a:t>
+              <a:t>8/16/23</a:t>
             </a:fld>
             <a:endParaRPr lang="en-US" dirty="0"/>
           </a:p>
@@ -1323,7 +2058,7 @@
           <a:p>
             <a:fld id="{C764DE79-268F-4C1A-8933-263129D2AF90}" type="datetimeFigureOut">
               <a:rPr lang="en-US" dirty="0"/>
-              <a:t>8/9/23</a:t>
+              <a:t>8/16/23</a:t>
             </a:fld>
             <a:endParaRPr lang="en-US" dirty="0"/>
           </a:p>
@@ -1564,7 +2299,7 @@
           <a:p>
             <a:fld id="{C764DE79-268F-4C1A-8933-263129D2AF90}" type="datetimeFigureOut">
               <a:rPr lang="en-US" dirty="0"/>
-              <a:t>8/9/23</a:t>
+              <a:t>8/16/23</a:t>
             </a:fld>
             <a:endParaRPr lang="en-US" dirty="0"/>
           </a:p>
@@ -1791,7 +2526,7 @@
           <a:p>
             <a:fld id="{C764DE79-268F-4C1A-8933-263129D2AF90}" type="datetimeFigureOut">
               <a:rPr lang="en-US" dirty="0"/>
-              <a:t>8/9/23</a:t>
+              <a:t>8/16/23</a:t>
             </a:fld>
             <a:endParaRPr lang="en-US" dirty="0"/>
           </a:p>
@@ -2153,7 +2888,7 @@
           <a:p>
             <a:fld id="{C764DE79-268F-4C1A-8933-263129D2AF90}" type="datetimeFigureOut">
               <a:rPr lang="en-US" dirty="0"/>
-              <a:t>8/9/23</a:t>
+              <a:t>8/16/23</a:t>
             </a:fld>
             <a:endParaRPr lang="en-US" dirty="0"/>
           </a:p>
@@ -2266,7 +3001,7 @@
           <a:p>
             <a:fld id="{C764DE79-268F-4C1A-8933-263129D2AF90}" type="datetimeFigureOut">
               <a:rPr lang="en-US" dirty="0"/>
-              <a:t>8/9/23</a:t>
+              <a:t>8/16/23</a:t>
             </a:fld>
             <a:endParaRPr lang="en-US" dirty="0"/>
           </a:p>
@@ -2384,7 +3119,7 @@
           <a:p>
             <a:fld id="{C764DE79-268F-4C1A-8933-263129D2AF90}" type="datetimeFigureOut">
               <a:rPr lang="en-US" dirty="0"/>
-              <a:t>8/9/23</a:t>
+              <a:t>8/16/23</a:t>
             </a:fld>
             <a:endParaRPr lang="en-US" dirty="0"/>
           </a:p>
@@ -2656,7 +3391,7 @@
           <a:p>
             <a:fld id="{C764DE79-268F-4C1A-8933-263129D2AF90}" type="datetimeFigureOut">
               <a:rPr lang="en-US" dirty="0"/>
-              <a:t>8/9/23</a:t>
+              <a:t>8/16/23</a:t>
             </a:fld>
             <a:endParaRPr lang="en-US" dirty="0"/>
           </a:p>
@@ -2908,7 +3643,7 @@
           <a:p>
             <a:fld id="{C764DE79-268F-4C1A-8933-263129D2AF90}" type="datetimeFigureOut">
               <a:rPr lang="en-US" dirty="0"/>
-              <a:t>8/9/23</a:t>
+              <a:t>8/16/23</a:t>
             </a:fld>
             <a:endParaRPr lang="en-US" dirty="0"/>
           </a:p>
@@ -3116,7 +3851,7 @@
           <a:p>
             <a:fld id="{C764DE79-268F-4C1A-8933-263129D2AF90}" type="datetimeFigureOut">
               <a:rPr lang="en-US" dirty="0"/>
-              <a:t>8/9/23</a:t>
+              <a:t>8/16/23</a:t>
             </a:fld>
             <a:endParaRPr lang="en-US" dirty="0"/>
           </a:p>
@@ -3502,6 +4237,14 @@
 <file path=ppt/slides/slide1.xml><?xml version="1.0" encoding="utf-8"?>
 <p:sld xmlns:a="http://schemas.openxmlformats.org/drawingml/2006/main" xmlns:r="http://schemas.openxmlformats.org/officeDocument/2006/relationships" xmlns:p="http://schemas.openxmlformats.org/presentationml/2006/main">
   <p:cSld>
+    <p:bg>
+      <p:bgPr shadeToTitle="1">
+        <a:solidFill>
+          <a:schemeClr val="bg1"/>
+        </a:solidFill>
+        <a:effectLst/>
+      </p:bgPr>
+    </p:bg>
     <p:spTree>
       <p:nvGrpSpPr>
         <p:cNvPr id="1" name=""/>
@@ -3534,7 +4277,7 @@
         </p:nvSpPr>
         <p:spPr>
           <a:xfrm>
-            <a:off x="1524000" y="1122363"/>
+            <a:off x="1524000" y="976059"/>
             <a:ext cx="9144000" cy="2387600"/>
           </a:xfrm>
         </p:spPr>
@@ -3567,7 +4310,7 @@
         </p:nvSpPr>
         <p:spPr>
           <a:xfrm>
-            <a:off x="1524000" y="3602038"/>
+            <a:off x="1524000" y="3363659"/>
             <a:ext cx="9144000" cy="1655762"/>
           </a:xfrm>
         </p:spPr>
@@ -3580,23 +4323,55 @@
             </a:pPr>
             <a:r>
               <a:rPr lang="nl-BE" dirty="0"/>
-              <a:t>Workshop UWC, 26th august</a:t>
+              <a:t>Workshop UWC, 26th August 2023</a:t>
             </a:r>
           </a:p>
           <a:p>
             <a:pPr marL="0" indent="0" algn="ctr">
               <a:buNone/>
             </a:pPr>
-            <a:endParaRPr lang="nl-BE" dirty="0"/>
-          </a:p>
-          <a:p>
-            <a:pPr marL="0" indent="0" algn="ctr">
-              <a:buNone/>
-            </a:pPr>
             <a:r>
               <a:rPr lang="nl-BE" dirty="0"/>
               <a:t>Simon Perneel</a:t>
             </a:r>
+          </a:p>
+        </p:txBody>
+      </p:sp>
+      <p:sp>
+        <p:nvSpPr>
+          <p:cNvPr id="4" name="Tekstvak 3">
+            <a:extLst>
+              <a:ext uri="{FF2B5EF4-FFF2-40B4-BE49-F238E27FC236}">
+                <a16:creationId xmlns:a16="http://schemas.microsoft.com/office/drawing/2014/main" id="{2104D903-AC94-F4C4-0A60-71496D436F91}"/>
+              </a:ext>
+            </a:extLst>
+          </p:cNvPr>
+          <p:cNvSpPr txBox="1"/>
+          <p:nvPr/>
+        </p:nvSpPr>
+        <p:spPr>
+          <a:xfrm>
+            <a:off x="3826789" y="6455664"/>
+            <a:ext cx="4538422" cy="307777"/>
+          </a:xfrm>
+          <a:prstGeom prst="rect">
+            <a:avLst/>
+          </a:prstGeom>
+          <a:noFill/>
+        </p:spPr>
+        <p:txBody>
+          <a:bodyPr wrap="none" rtlCol="0">
+            <a:spAutoFit/>
+          </a:bodyPr>
+          <a:lstStyle/>
+          <a:p>
+            <a:r>
+              <a:rPr lang="nl-BE" sz="1400" dirty="0">
+                <a:hlinkClick r:id="rId2"/>
+              </a:rPr>
+              <a:t>https://github.com/simonperneel/DS-python-data-analysis</a:t>
+            </a:r>
+            <a:endParaRPr lang="nl-BE" sz="1400" dirty="0"/>
           </a:p>
         </p:txBody>
       </p:sp>
@@ -3648,8 +4423,8 @@
         </p:nvSpPr>
         <p:spPr>
           <a:xfrm>
-            <a:off x="2968658" y="1420928"/>
-            <a:ext cx="7356442" cy="2557184"/>
+            <a:off x="404037" y="0"/>
+            <a:ext cx="7592532" cy="1722474"/>
           </a:xfrm>
         </p:spPr>
         <p:txBody>
@@ -3659,7 +4434,7 @@
           <a:lstStyle/>
           <a:p>
             <a:r>
-              <a:rPr lang="nl-BE" sz="6600" dirty="0"/>
+              <a:rPr lang="nl-BE" sz="5400" dirty="0"/>
               <a:t>Let’s get started!</a:t>
             </a:r>
           </a:p>
@@ -3716,14 +4491,134 @@
         </p:blipFill>
         <p:spPr>
           <a:xfrm>
-            <a:off x="6096000" y="3585586"/>
-            <a:ext cx="6308692" cy="3548639"/>
+            <a:off x="5943300" y="3645470"/>
+            <a:ext cx="6648243" cy="3739636"/>
           </a:xfrm>
           <a:prstGeom prst="rect">
             <a:avLst/>
           </a:prstGeom>
         </p:spPr>
       </p:pic>
+      <p:sp>
+        <p:nvSpPr>
+          <p:cNvPr id="5" name="Tekstvak 4">
+            <a:extLst>
+              <a:ext uri="{FF2B5EF4-FFF2-40B4-BE49-F238E27FC236}">
+                <a16:creationId xmlns:a16="http://schemas.microsoft.com/office/drawing/2014/main" id="{0F8DCFE2-C77C-E053-6A35-5D0C391BAA9B}"/>
+              </a:ext>
+            </a:extLst>
+          </p:cNvPr>
+          <p:cNvSpPr txBox="1"/>
+          <p:nvPr/>
+        </p:nvSpPr>
+        <p:spPr>
+          <a:xfrm>
+            <a:off x="948816" y="1642871"/>
+            <a:ext cx="10294368" cy="1569660"/>
+          </a:xfrm>
+          <a:prstGeom prst="rect">
+            <a:avLst/>
+          </a:prstGeom>
+          <a:noFill/>
+        </p:spPr>
+        <p:txBody>
+          <a:bodyPr wrap="square">
+            <a:spAutoFit/>
+          </a:bodyPr>
+          <a:lstStyle/>
+          <a:p>
+            <a:pPr marL="457200" indent="-457200" algn="l">
+              <a:buFont typeface="+mj-lt"/>
+              <a:buAutoNum type="arabicPeriod"/>
+            </a:pPr>
+            <a:r>
+              <a:rPr lang="nl-BE" sz="2400" b="0" i="0" u="none" strike="noStrike" dirty="0">
+                <a:effectLst/>
+              </a:rPr>
+              <a:t>Download the course material to your computer:  </a:t>
+            </a:r>
+          </a:p>
+          <a:p>
+            <a:pPr marL="457200" indent="-457200" algn="l">
+              <a:buFont typeface="+mj-lt"/>
+              <a:buAutoNum type="arabicPeriod"/>
+            </a:pPr>
+            <a:r>
+              <a:rPr lang="nl-BE" sz="2400" b="0" i="0" u="none" strike="noStrike" dirty="0">
+                <a:effectLst/>
+              </a:rPr>
+              <a:t>Set up your environment and install the needed packages for the workshop</a:t>
+            </a:r>
+          </a:p>
+          <a:p>
+            <a:pPr marL="457200" indent="-457200" algn="l">
+              <a:buFont typeface="+mj-lt"/>
+              <a:buAutoNum type="arabicPeriod"/>
+            </a:pPr>
+            <a:r>
+              <a:rPr lang="nl-BE" sz="2400" dirty="0"/>
+              <a:t>Test your configurations</a:t>
+            </a:r>
+            <a:endParaRPr lang="nl-BE" sz="2400" b="0" i="0" u="none" strike="noStrike" dirty="0">
+              <a:effectLst/>
+            </a:endParaRPr>
+          </a:p>
+          <a:p>
+            <a:pPr marL="457200" indent="-457200" algn="l">
+              <a:buFont typeface="+mj-lt"/>
+              <a:buAutoNum type="arabicPeriod"/>
+            </a:pPr>
+            <a:r>
+              <a:rPr lang="nl-BE" sz="2400" b="0" i="0" u="none" strike="noStrike" dirty="0">
+                <a:effectLst/>
+              </a:rPr>
+              <a:t>Start Jupyter lab from Anaconda</a:t>
+            </a:r>
+          </a:p>
+        </p:txBody>
+      </p:sp>
+      <p:sp>
+        <p:nvSpPr>
+          <p:cNvPr id="7" name="Tekstvak 6">
+            <a:extLst>
+              <a:ext uri="{FF2B5EF4-FFF2-40B4-BE49-F238E27FC236}">
+                <a16:creationId xmlns:a16="http://schemas.microsoft.com/office/drawing/2014/main" id="{FEC0ECC3-F29F-0192-A175-63C3B973CAE2}"/>
+              </a:ext>
+            </a:extLst>
+          </p:cNvPr>
+          <p:cNvSpPr txBox="1"/>
+          <p:nvPr/>
+        </p:nvSpPr>
+        <p:spPr>
+          <a:xfrm>
+            <a:off x="712381" y="3802543"/>
+            <a:ext cx="5230919" cy="369332"/>
+          </a:xfrm>
+          <a:prstGeom prst="rect">
+            <a:avLst/>
+          </a:prstGeom>
+          <a:noFill/>
+        </p:spPr>
+        <p:txBody>
+          <a:bodyPr wrap="none" rtlCol="0">
+            <a:spAutoFit/>
+          </a:bodyPr>
+          <a:lstStyle/>
+          <a:p>
+            <a:r>
+              <a:rPr lang="nl-BE" dirty="0"/>
+              <a:t>Detailed instructions: </a:t>
+            </a:r>
+            <a:r>
+              <a:rPr lang="nl-BE" dirty="0">
+                <a:hlinkClick r:id="rId4"/>
+              </a:rPr>
+              <a:t>https://simonperneel.github.io</a:t>
+            </a:r>
+            <a:endParaRPr lang="nl-BE" dirty="0"/>
+          </a:p>
+        </p:txBody>
+      </p:sp>
     </p:spTree>
     <p:extLst>
       <p:ext uri="{BB962C8B-B14F-4D97-AF65-F5344CB8AC3E}">
@@ -3778,13 +4673,13 @@
           <a:lstStyle/>
           <a:p>
             <a:r>
-              <a:rPr lang="nl-BE" sz="3200" dirty="0"/>
+              <a:rPr lang="nl-BE" sz="3600" dirty="0"/>
               <a:t>Simon Perneel</a:t>
             </a:r>
             <a:br>
-              <a:rPr lang="nl-BE" sz="3200" dirty="0"/>
+              <a:rPr lang="nl-BE" sz="3600" dirty="0"/>
             </a:br>
-            <a:endParaRPr lang="nl-BE" sz="3200" dirty="0"/>
+            <a:endParaRPr lang="nl-BE" sz="3600" dirty="0"/>
           </a:p>
         </p:txBody>
       </p:sp>
@@ -3804,14 +4699,19 @@
             <p:ph idx="1"/>
           </p:nvPr>
         </p:nvSpPr>
-        <p:spPr/>
+        <p:spPr>
+          <a:xfrm>
+            <a:off x="838200" y="1960120"/>
+            <a:ext cx="10515600" cy="4351338"/>
+          </a:xfrm>
+        </p:spPr>
         <p:txBody>
           <a:bodyPr/>
           <a:lstStyle/>
           <a:p>
             <a:r>
               <a:rPr lang="nl-BE" dirty="0"/>
-              <a:t>Data scientist @Imec-mict-Ugent</a:t>
+              <a:t>Data scientist @Imec-mict-Ugent  </a:t>
             </a:r>
           </a:p>
           <a:p>
@@ -3833,6 +4733,17 @@
               <a:rPr lang="nl-BE" dirty="0"/>
               <a:t>digital media use</a:t>
             </a:r>
+          </a:p>
+          <a:p>
+            <a:pPr lvl="2"/>
+            <a:r>
+              <a:rPr lang="nl-BE" dirty="0"/>
+              <a:t>Relationship with moods/stress</a:t>
+            </a:r>
+          </a:p>
+          <a:p>
+            <a:pPr lvl="2"/>
+            <a:endParaRPr lang="nl-BE" dirty="0"/>
           </a:p>
           <a:p>
             <a:r>
@@ -3859,10 +4770,10 @@
         </p:nvGrpSpPr>
         <p:grpSpPr>
           <a:xfrm>
-            <a:off x="3193093" y="1036340"/>
-            <a:ext cx="2880177" cy="307777"/>
-            <a:chOff x="1136602" y="4685975"/>
-            <a:chExt cx="2880177" cy="307777"/>
+            <a:off x="3653169" y="1092474"/>
+            <a:ext cx="3228030" cy="338554"/>
+            <a:chOff x="1363416" y="4674712"/>
+            <a:chExt cx="3228030" cy="338554"/>
           </a:xfrm>
         </p:grpSpPr>
         <p:pic>
@@ -3880,14 +4791,14 @@
             <p:nvPr/>
           </p:nvPicPr>
           <p:blipFill>
-            <a:blip r:embed="rId2"/>
+            <a:blip r:embed="rId3"/>
             <a:stretch>
               <a:fillRect/>
             </a:stretch>
           </p:blipFill>
           <p:spPr>
             <a:xfrm>
-              <a:off x="1136602" y="4720007"/>
+              <a:off x="1363416" y="4724133"/>
               <a:ext cx="239711" cy="239711"/>
             </a:xfrm>
             <a:prstGeom prst="rect">
@@ -3909,8 +4820,8 @@
           </p:nvSpPr>
           <p:spPr>
             <a:xfrm>
-              <a:off x="1376313" y="4685975"/>
-              <a:ext cx="2640466" cy="307777"/>
+              <a:off x="1603127" y="4674712"/>
+              <a:ext cx="2988319" cy="338554"/>
             </a:xfrm>
             <a:prstGeom prst="rect">
               <a:avLst/>
@@ -3924,12 +4835,12 @@
             <a:lstStyle/>
             <a:p>
               <a:r>
-                <a:rPr lang="nl-BE" sz="1400" dirty="0">
-                  <a:hlinkClick r:id="rId3"/>
+                <a:rPr lang="nl-BE" sz="1600" dirty="0">
+                  <a:hlinkClick r:id="rId4"/>
                 </a:rPr>
                 <a:t>https://github.com/simonperneel</a:t>
               </a:r>
-              <a:endParaRPr lang="nl-BE" sz="1400" dirty="0"/>
+              <a:endParaRPr lang="nl-BE" sz="1600" dirty="0"/>
             </a:p>
           </p:txBody>
         </p:sp>
@@ -3948,10 +4859,10 @@
         </p:nvGrpSpPr>
         <p:grpSpPr>
           <a:xfrm>
-            <a:off x="838200" y="1027906"/>
-            <a:ext cx="2354893" cy="316211"/>
-            <a:chOff x="3899720" y="1027906"/>
-            <a:chExt cx="2354893" cy="316211"/>
+            <a:off x="957166" y="1092474"/>
+            <a:ext cx="2638566" cy="348259"/>
+            <a:chOff x="3897526" y="988189"/>
+            <a:chExt cx="2638566" cy="348259"/>
           </a:xfrm>
         </p:grpSpPr>
         <p:pic>
@@ -3969,10 +4880,10 @@
             <p:nvPr/>
           </p:nvPicPr>
           <p:blipFill>
-            <a:blip r:embed="rId4">
+            <a:blip r:embed="rId5">
               <a:extLst>
                 <a:ext uri="{96DAC541-7B7A-43D3-8B79-37D633B846F1}">
-                  <asvg:svgBlip xmlns:asvg="http://schemas.microsoft.com/office/drawing/2016/SVG/main" r:embed="rId5"/>
+                  <asvg:svgBlip xmlns:asvg="http://schemas.microsoft.com/office/drawing/2016/SVG/main" r:embed="rId6"/>
                 </a:ext>
               </a:extLst>
             </a:blip>
@@ -3982,7 +4893,7 @@
           </p:blipFill>
           <p:spPr>
             <a:xfrm>
-              <a:off x="3899720" y="1027906"/>
+              <a:off x="3897526" y="1020237"/>
               <a:ext cx="316211" cy="316211"/>
             </a:xfrm>
             <a:prstGeom prst="rect">
@@ -4004,8 +4915,8 @@
           </p:nvSpPr>
           <p:spPr>
             <a:xfrm>
-              <a:off x="4157564" y="1027906"/>
-              <a:ext cx="2097049" cy="307777"/>
+              <a:off x="4163327" y="988189"/>
+              <a:ext cx="2372765" cy="338554"/>
             </a:xfrm>
             <a:prstGeom prst="rect">
               <a:avLst/>
@@ -4019,16 +4930,45 @@
             <a:lstStyle/>
             <a:p>
               <a:r>
-                <a:rPr lang="nl-BE" sz="1400" dirty="0">
-                  <a:hlinkClick r:id="rId3"/>
+                <a:rPr lang="nl-BE" sz="1600" dirty="0">
+                  <a:hlinkClick r:id="rId4"/>
                 </a:rPr>
                 <a:t>simon.perneel@ugent.be</a:t>
               </a:r>
-              <a:endParaRPr lang="nl-BE" sz="1400" dirty="0"/>
+              <a:endParaRPr lang="nl-BE" sz="1600" dirty="0"/>
             </a:p>
           </p:txBody>
         </p:sp>
       </p:grpSp>
+      <p:pic>
+        <p:nvPicPr>
+          <p:cNvPr id="12" name="Afbeelding 11">
+            <a:extLst>
+              <a:ext uri="{FF2B5EF4-FFF2-40B4-BE49-F238E27FC236}">
+                <a16:creationId xmlns:a16="http://schemas.microsoft.com/office/drawing/2014/main" id="{CC1BA3B3-BFE2-2266-E683-F93D84A6B5A2}"/>
+              </a:ext>
+            </a:extLst>
+          </p:cNvPr>
+          <p:cNvPicPr>
+            <a:picLocks noChangeAspect="1"/>
+          </p:cNvPicPr>
+          <p:nvPr/>
+        </p:nvPicPr>
+        <p:blipFill rotWithShape="1">
+          <a:blip r:embed="rId7"/>
+          <a:srcRect b="4203"/>
+          <a:stretch/>
+        </p:blipFill>
+        <p:spPr>
+          <a:xfrm>
+            <a:off x="9153144" y="0"/>
+            <a:ext cx="3038856" cy="2911139"/>
+          </a:xfrm>
+          <a:prstGeom prst="rect">
+            <a:avLst/>
+          </a:prstGeom>
+        </p:spPr>
+      </p:pic>
     </p:spTree>
     <p:extLst>
       <p:ext uri="{BB962C8B-B14F-4D97-AF65-F5344CB8AC3E}">
@@ -4218,7 +5158,7 @@
                     <a:p>
                       <a:pPr algn="ctr"/>
                       <a:r>
-                        <a:rPr lang="nl-BE" sz="1400" b="1">
+                        <a:rPr lang="nl-BE" sz="1400" b="1" dirty="0">
                           <a:effectLst/>
                           <a:latin typeface="Arial" panose="020B0604020202020204" pitchFamily="34" charset="0"/>
                           <a:cs typeface="Arial" panose="020B0604020202020204" pitchFamily="34" charset="0"/>
@@ -4341,7 +5281,7 @@
                     <a:p>
                       <a:pPr algn="ctr"/>
                       <a:r>
-                        <a:rPr lang="nl-BE" sz="1400">
+                        <a:rPr lang="nl-BE" sz="1400" dirty="0">
                           <a:effectLst/>
                           <a:latin typeface="Arial" panose="020B0604020202020204" pitchFamily="34" charset="0"/>
                           <a:cs typeface="Arial" panose="020B0604020202020204" pitchFamily="34" charset="0"/>
@@ -4587,7 +5527,7 @@
                     <a:p>
                       <a:pPr algn="ctr"/>
                       <a:r>
-                        <a:rPr lang="nl-BE" sz="1400">
+                        <a:rPr lang="nl-BE" sz="1400" dirty="0">
                           <a:effectLst/>
                           <a:latin typeface="Arial" panose="020B0604020202020204" pitchFamily="34" charset="0"/>
                           <a:cs typeface="Arial" panose="020B0604020202020204" pitchFamily="34" charset="0"/>
@@ -4833,7 +5773,7 @@
                     <a:p>
                       <a:pPr algn="ctr"/>
                       <a:r>
-                        <a:rPr lang="nl-BE" sz="1400">
+                        <a:rPr lang="nl-BE" sz="1400" dirty="0">
                           <a:effectLst/>
                           <a:latin typeface="Arial" panose="020B0604020202020204" pitchFamily="34" charset="0"/>
                           <a:cs typeface="Arial" panose="020B0604020202020204" pitchFamily="34" charset="0"/>
@@ -5137,7 +6077,7 @@
                     <a:p>
                       <a:pPr algn="ctr"/>
                       <a:r>
-                        <a:rPr lang="nl-BE" sz="1400">
+                        <a:rPr lang="nl-BE" sz="1400" dirty="0">
                           <a:effectLst/>
                           <a:latin typeface="Arial" panose="020B0604020202020204" pitchFamily="34" charset="0"/>
                           <a:cs typeface="Arial" panose="020B0604020202020204" pitchFamily="34" charset="0"/>
@@ -5260,7 +6200,7 @@
                     <a:p>
                       <a:pPr algn="ctr"/>
                       <a:r>
-                        <a:rPr lang="nl-BE" sz="1400">
+                        <a:rPr lang="nl-BE" sz="1400" dirty="0">
                           <a:effectLst/>
                           <a:latin typeface="Arial" panose="020B0604020202020204" pitchFamily="34" charset="0"/>
                           <a:cs typeface="Arial" panose="020B0604020202020204" pitchFamily="34" charset="0"/>
@@ -5383,7 +6323,7 @@
                     <a:p>
                       <a:pPr algn="ctr"/>
                       <a:r>
-                        <a:rPr lang="nl-BE" sz="1400">
+                        <a:rPr lang="nl-BE" sz="1400" dirty="0">
                           <a:effectLst/>
                           <a:latin typeface="Arial" panose="020B0604020202020204" pitchFamily="34" charset="0"/>
                           <a:cs typeface="Arial" panose="020B0604020202020204" pitchFamily="34" charset="0"/>
@@ -5506,7 +6446,7 @@
                     <a:p>
                       <a:pPr algn="ctr"/>
                       <a:r>
-                        <a:rPr lang="nl-BE" sz="1400">
+                        <a:rPr lang="nl-BE" sz="1400" dirty="0">
                           <a:effectLst/>
                           <a:latin typeface="Arial" panose="020B0604020202020204" pitchFamily="34" charset="0"/>
                           <a:cs typeface="Arial" panose="020B0604020202020204" pitchFamily="34" charset="0"/>
@@ -5629,7 +6569,7 @@
                     <a:p>
                       <a:pPr algn="ctr"/>
                       <a:r>
-                        <a:rPr lang="nl-BE" sz="1400">
+                        <a:rPr lang="nl-BE" sz="1400" dirty="0">
                           <a:effectLst/>
                           <a:latin typeface="Arial" panose="020B0604020202020204" pitchFamily="34" charset="0"/>
                           <a:cs typeface="Arial" panose="020B0604020202020204" pitchFamily="34" charset="0"/>
@@ -5752,7 +6692,7 @@
                     <a:p>
                       <a:pPr algn="ctr"/>
                       <a:r>
-                        <a:rPr lang="nl-BE" sz="1400">
+                        <a:rPr lang="nl-BE" sz="1400" dirty="0">
                           <a:effectLst/>
                           <a:latin typeface="Arial" panose="020B0604020202020204" pitchFamily="34" charset="0"/>
                           <a:cs typeface="Arial" panose="020B0604020202020204" pitchFamily="34" charset="0"/>
@@ -5875,7 +6815,7 @@
                     <a:p>
                       <a:pPr algn="ctr"/>
                       <a:r>
-                        <a:rPr lang="nl-BE" sz="1400">
+                        <a:rPr lang="nl-BE" sz="1400" dirty="0">
                           <a:effectLst/>
                           <a:latin typeface="Arial" panose="020B0604020202020204" pitchFamily="34" charset="0"/>
                           <a:cs typeface="Arial" panose="020B0604020202020204" pitchFamily="34" charset="0"/>
@@ -6139,7 +7079,7 @@
           <p:nvPr/>
         </p:nvPicPr>
         <p:blipFill>
-          <a:blip r:embed="rId2"/>
+          <a:blip r:embed="rId3"/>
           <a:stretch>
             <a:fillRect/>
           </a:stretch>
@@ -6168,8 +7108,8 @@
         </p:nvSpPr>
         <p:spPr>
           <a:xfrm>
-            <a:off x="10061543" y="6174557"/>
-            <a:ext cx="2130457" cy="584775"/>
+            <a:off x="10061543" y="5781152"/>
+            <a:ext cx="2130457" cy="1077218"/>
           </a:xfrm>
           <a:prstGeom prst="rect">
             <a:avLst/>
@@ -6186,6 +7126,15 @@
               <a:rPr lang="nl-BE" sz="800" dirty="0"/>
               <a:t>Sarih, Houda &amp; Tchangani, Ayeley &amp; Medjaher, Kamal &amp; PERE, Eric. (2019). Data preparation and preprocessing for broadcast systems monitoring in PHM framework. </a:t>
             </a:r>
+          </a:p>
+          <a:p>
+            <a:r>
+              <a:rPr lang="nl-BE" sz="800" dirty="0">
+                <a:hlinkClick r:id="rId4"/>
+              </a:rPr>
+              <a:t>https://www.forbes.com/sites/gilpress/2016/03/23/data-preparation-most-time-consuming-least-enjoyable-data-science-task-survey-says/</a:t>
+            </a:r>
+            <a:endParaRPr lang="nl-BE" sz="800" dirty="0"/>
           </a:p>
         </p:txBody>
       </p:sp>
@@ -6304,7 +7253,7 @@
           <p:nvPr/>
         </p:nvPicPr>
         <p:blipFill>
-          <a:blip r:embed="rId2"/>
+          <a:blip r:embed="rId3"/>
           <a:stretch>
             <a:fillRect/>
           </a:stretch>
@@ -6391,7 +7340,7 @@
                   <a:schemeClr val="bg1"/>
                 </a:solidFill>
               </a:rPr>
-              <a:t>Working with Python</a:t>
+              <a:t>Python for data science</a:t>
             </a:r>
           </a:p>
         </p:txBody>
@@ -6411,7 +7360,7 @@
           <p:nvPr/>
         </p:nvPicPr>
         <p:blipFill rotWithShape="1">
-          <a:blip r:embed="rId2"/>
+          <a:blip r:embed="rId3"/>
           <a:srcRect l="30200" r="28199" b="34667"/>
           <a:stretch/>
         </p:blipFill>
@@ -6473,7 +7422,7 @@
         </p:nvSpPr>
         <p:spPr>
           <a:xfrm>
-            <a:off x="366860" y="270857"/>
+            <a:off x="364643" y="-5536"/>
             <a:ext cx="10515600" cy="1325563"/>
           </a:xfrm>
         </p:spPr>
@@ -6602,8 +7551,8 @@
         </p:blipFill>
         <p:spPr>
           <a:xfrm>
-            <a:off x="4654798" y="3056315"/>
-            <a:ext cx="1746710" cy="520180"/>
+            <a:off x="4431032" y="2867255"/>
+            <a:ext cx="2557951" cy="761772"/>
           </a:xfrm>
           <a:prstGeom prst="rect">
             <a:avLst/>
@@ -6632,8 +7581,8 @@
         </p:blipFill>
         <p:spPr>
           <a:xfrm>
-            <a:off x="7281732" y="2691369"/>
-            <a:ext cx="1020962" cy="1281207"/>
+            <a:off x="7525025" y="2975247"/>
+            <a:ext cx="674529" cy="846468"/>
           </a:xfrm>
           <a:prstGeom prst="rect">
             <a:avLst/>
@@ -6662,8 +7611,8 @@
         </p:blipFill>
         <p:spPr>
           <a:xfrm>
-            <a:off x="1728345" y="3552489"/>
-            <a:ext cx="2046229" cy="406343"/>
+            <a:off x="1728345" y="3545142"/>
+            <a:ext cx="2083227" cy="413690"/>
           </a:xfrm>
           <a:prstGeom prst="rect">
             <a:avLst/>
@@ -6692,37 +7641,8 @@
         </p:blipFill>
         <p:spPr>
           <a:xfrm>
-            <a:off x="319963" y="4213640"/>
+            <a:off x="319963" y="4273620"/>
             <a:ext cx="1539819" cy="584637"/>
-          </a:xfrm>
-          <a:prstGeom prst="rect">
-            <a:avLst/>
-          </a:prstGeom>
-        </p:spPr>
-      </p:pic>
-      <p:pic>
-        <p:nvPicPr>
-          <p:cNvPr id="21" name="Afbeelding 20">
-            <a:extLst>
-              <a:ext uri="{FF2B5EF4-FFF2-40B4-BE49-F238E27FC236}">
-                <a16:creationId xmlns:a16="http://schemas.microsoft.com/office/drawing/2014/main" id="{407B6AB6-1C0B-7A75-99E2-F95C2F9DB4EC}"/>
-              </a:ext>
-            </a:extLst>
-          </p:cNvPr>
-          <p:cNvPicPr>
-            <a:picLocks noChangeAspect="1"/>
-          </p:cNvPicPr>
-          <p:nvPr/>
-        </p:nvPicPr>
-        <p:blipFill rotWithShape="1">
-          <a:blip r:embed="rId10"/>
-          <a:srcRect l="-1" t="-1" r="-9708" b="-9708"/>
-          <a:stretch/>
-        </p:blipFill>
-        <p:spPr>
-          <a:xfrm>
-            <a:off x="9557236" y="3771595"/>
-            <a:ext cx="1789986" cy="812800"/>
           </a:xfrm>
           <a:prstGeom prst="rect">
             <a:avLst/>
@@ -6744,7 +7664,7 @@
           <p:nvPr/>
         </p:nvPicPr>
         <p:blipFill>
-          <a:blip r:embed="rId11"/>
+          <a:blip r:embed="rId10"/>
           <a:stretch>
             <a:fillRect/>
           </a:stretch>
@@ -6774,7 +7694,7 @@
           <p:nvPr/>
         </p:nvPicPr>
         <p:blipFill>
-          <a:blip r:embed="rId12"/>
+          <a:blip r:embed="rId11"/>
           <a:stretch>
             <a:fillRect/>
           </a:stretch>
@@ -6945,15 +7865,15 @@
           <p:nvPr/>
         </p:nvPicPr>
         <p:blipFill>
-          <a:blip r:embed="rId13"/>
+          <a:blip r:embed="rId12"/>
           <a:stretch>
             <a:fillRect/>
           </a:stretch>
         </p:blipFill>
         <p:spPr>
           <a:xfrm>
-            <a:off x="9502056" y="1183364"/>
-            <a:ext cx="1845166" cy="1180618"/>
+            <a:off x="14616" y="2196869"/>
+            <a:ext cx="1713178" cy="1096166"/>
           </a:xfrm>
           <a:prstGeom prst="rect">
             <a:avLst/>
@@ -6975,14 +7895,14 @@
           <p:nvPr/>
         </p:nvPicPr>
         <p:blipFill>
-          <a:blip r:embed="rId14"/>
+          <a:blip r:embed="rId13"/>
           <a:stretch>
             <a:fillRect/>
           </a:stretch>
         </p:blipFill>
         <p:spPr>
           <a:xfrm>
-            <a:off x="364643" y="2027530"/>
+            <a:off x="9886135" y="1103247"/>
             <a:ext cx="2046229" cy="584637"/>
           </a:xfrm>
           <a:prstGeom prst="rect">
@@ -7005,15 +7925,15 @@
           <p:nvPr/>
         </p:nvPicPr>
         <p:blipFill>
-          <a:blip r:embed="rId15"/>
+          <a:blip r:embed="rId14"/>
           <a:stretch>
             <a:fillRect/>
           </a:stretch>
         </p:blipFill>
         <p:spPr>
           <a:xfrm>
-            <a:off x="2410872" y="1430805"/>
-            <a:ext cx="1996480" cy="578979"/>
+            <a:off x="2047840" y="1773786"/>
+            <a:ext cx="1887114" cy="547263"/>
           </a:xfrm>
           <a:prstGeom prst="rect">
             <a:avLst/>
@@ -7035,14 +7955,14 @@
           <p:nvPr/>
         </p:nvPicPr>
         <p:blipFill>
-          <a:blip r:embed="rId16"/>
+          <a:blip r:embed="rId15"/>
           <a:stretch>
             <a:fillRect/>
           </a:stretch>
         </p:blipFill>
         <p:spPr>
           <a:xfrm>
-            <a:off x="8596243" y="312791"/>
+            <a:off x="8424142" y="309598"/>
             <a:ext cx="2155828" cy="718609"/>
           </a:xfrm>
           <a:prstGeom prst="rect">
@@ -7065,7 +7985,7 @@
           <p:nvPr/>
         </p:nvPicPr>
         <p:blipFill>
-          <a:blip r:embed="rId17"/>
+          <a:blip r:embed="rId16"/>
           <a:stretch>
             <a:fillRect/>
           </a:stretch>
@@ -7095,14 +8015,14 @@
           <p:nvPr/>
         </p:nvPicPr>
         <p:blipFill>
-          <a:blip r:embed="rId18"/>
+          <a:blip r:embed="rId17"/>
           <a:stretch>
             <a:fillRect/>
           </a:stretch>
         </p:blipFill>
         <p:spPr>
           <a:xfrm>
-            <a:off x="7152313" y="1194551"/>
+            <a:off x="7212749" y="1395565"/>
             <a:ext cx="1803617" cy="642778"/>
           </a:xfrm>
           <a:prstGeom prst="rect">
@@ -7125,15 +8045,15 @@
           <p:nvPr/>
         </p:nvPicPr>
         <p:blipFill>
-          <a:blip r:embed="rId19"/>
+          <a:blip r:embed="rId18"/>
           <a:stretch>
             <a:fillRect/>
           </a:stretch>
         </p:blipFill>
         <p:spPr>
           <a:xfrm>
-            <a:off x="6617989" y="196404"/>
-            <a:ext cx="1042406" cy="547263"/>
+            <a:off x="441106" y="1072259"/>
+            <a:ext cx="1418676" cy="744805"/>
           </a:xfrm>
           <a:prstGeom prst="rect">
             <a:avLst/>
@@ -7155,6 +8075,36 @@
           <p:nvPr/>
         </p:nvPicPr>
         <p:blipFill>
+          <a:blip r:embed="rId19"/>
+          <a:stretch>
+            <a:fillRect/>
+          </a:stretch>
+        </p:blipFill>
+        <p:spPr>
+          <a:xfrm>
+            <a:off x="3658984" y="703466"/>
+            <a:ext cx="994756" cy="994756"/>
+          </a:xfrm>
+          <a:prstGeom prst="rect">
+            <a:avLst/>
+          </a:prstGeom>
+        </p:spPr>
+      </p:pic>
+      <p:pic>
+        <p:nvPicPr>
+          <p:cNvPr id="4" name="Afbeelding 3">
+            <a:extLst>
+              <a:ext uri="{FF2B5EF4-FFF2-40B4-BE49-F238E27FC236}">
+                <a16:creationId xmlns:a16="http://schemas.microsoft.com/office/drawing/2014/main" id="{5B8677EC-3184-2324-1923-E0E1C834D52A}"/>
+              </a:ext>
+            </a:extLst>
+          </p:cNvPr>
+          <p:cNvPicPr>
+            <a:picLocks noChangeAspect="1"/>
+          </p:cNvPicPr>
+          <p:nvPr/>
+        </p:nvPicPr>
+        <p:blipFill>
           <a:blip r:embed="rId20"/>
           <a:stretch>
             <a:fillRect/>
@@ -7162,8 +8112,68 @@
         </p:blipFill>
         <p:spPr>
           <a:xfrm>
-            <a:off x="4198561" y="178039"/>
-            <a:ext cx="1042406" cy="1042406"/>
+            <a:off x="10755866" y="2556448"/>
+            <a:ext cx="1243228" cy="621614"/>
+          </a:xfrm>
+          <a:prstGeom prst="rect">
+            <a:avLst/>
+          </a:prstGeom>
+        </p:spPr>
+      </p:pic>
+      <p:pic>
+        <p:nvPicPr>
+          <p:cNvPr id="6" name="Afbeelding 5">
+            <a:extLst>
+              <a:ext uri="{FF2B5EF4-FFF2-40B4-BE49-F238E27FC236}">
+                <a16:creationId xmlns:a16="http://schemas.microsoft.com/office/drawing/2014/main" id="{D28EC7DC-3C75-E32E-7203-0848916FE84E}"/>
+              </a:ext>
+            </a:extLst>
+          </p:cNvPr>
+          <p:cNvPicPr>
+            <a:picLocks noChangeAspect="1"/>
+          </p:cNvPicPr>
+          <p:nvPr/>
+        </p:nvPicPr>
+        <p:blipFill>
+          <a:blip r:embed="rId21"/>
+          <a:stretch>
+            <a:fillRect/>
+          </a:stretch>
+        </p:blipFill>
+        <p:spPr>
+          <a:xfrm>
+            <a:off x="6602158" y="302479"/>
+            <a:ext cx="1164833" cy="842739"/>
+          </a:xfrm>
+          <a:prstGeom prst="rect">
+            <a:avLst/>
+          </a:prstGeom>
+        </p:spPr>
+      </p:pic>
+      <p:pic>
+        <p:nvPicPr>
+          <p:cNvPr id="7" name="Afbeelding 6">
+            <a:extLst>
+              <a:ext uri="{FF2B5EF4-FFF2-40B4-BE49-F238E27FC236}">
+                <a16:creationId xmlns:a16="http://schemas.microsoft.com/office/drawing/2014/main" id="{21DA2D34-A291-9F26-6B91-6984016F5910}"/>
+              </a:ext>
+            </a:extLst>
+          </p:cNvPr>
+          <p:cNvPicPr>
+            <a:picLocks noChangeAspect="1"/>
+          </p:cNvPicPr>
+          <p:nvPr/>
+        </p:nvPicPr>
+        <p:blipFill>
+          <a:blip r:embed="rId22"/>
+          <a:stretch>
+            <a:fillRect/>
+          </a:stretch>
+        </p:blipFill>
+        <p:spPr>
+          <a:xfrm>
+            <a:off x="9530128" y="3879811"/>
+            <a:ext cx="1780418" cy="667657"/>
           </a:xfrm>
           <a:prstGeom prst="rect">
             <a:avLst/>
@@ -7237,96 +8247,6 @@
       </p:sp>
       <p:sp>
         <p:nvSpPr>
-          <p:cNvPr id="6" name="Tekstvak 5">
-            <a:extLst>
-              <a:ext uri="{FF2B5EF4-FFF2-40B4-BE49-F238E27FC236}">
-                <a16:creationId xmlns:a16="http://schemas.microsoft.com/office/drawing/2014/main" id="{FF60132E-3EAA-1510-DC5F-A0E26EFCD71F}"/>
-              </a:ext>
-            </a:extLst>
-          </p:cNvPr>
-          <p:cNvSpPr txBox="1"/>
-          <p:nvPr/>
-        </p:nvSpPr>
-        <p:spPr>
-          <a:xfrm>
-            <a:off x="1135632" y="3429000"/>
-            <a:ext cx="10294368" cy="1569660"/>
-          </a:xfrm>
-          <a:prstGeom prst="rect">
-            <a:avLst/>
-          </a:prstGeom>
-          <a:noFill/>
-        </p:spPr>
-        <p:txBody>
-          <a:bodyPr wrap="square">
-            <a:spAutoFit/>
-          </a:bodyPr>
-          <a:lstStyle/>
-          <a:p>
-            <a:pPr marL="457200" indent="-457200" algn="l">
-              <a:buFont typeface="+mj-lt"/>
-              <a:buAutoNum type="arabicPeriod"/>
-            </a:pPr>
-            <a:r>
-              <a:rPr lang="nl-BE" sz="2400" b="0" i="0" u="none" strike="noStrike" dirty="0">
-                <a:effectLst/>
-              </a:rPr>
-              <a:t> Install Python and the required Python packages (if on own computer)</a:t>
-            </a:r>
-          </a:p>
-          <a:p>
-            <a:pPr marL="457200" indent="-457200" algn="l">
-              <a:buFont typeface="+mj-lt"/>
-              <a:buAutoNum type="arabicPeriod"/>
-            </a:pPr>
-            <a:r>
-              <a:rPr lang="nl-BE" sz="2400" b="0" i="0" u="none" strike="noStrike" dirty="0">
-                <a:effectLst/>
-              </a:rPr>
-              <a:t> Download the course material to your computer:  </a:t>
-            </a:r>
-            <a:r>
-              <a:rPr lang="nl-BE" sz="2400" b="0" i="0" u="none" strike="noStrike" dirty="0">
-                <a:effectLst/>
-                <a:hlinkClick r:id="rId3"/>
-              </a:rPr>
-              <a:t>here</a:t>
-            </a:r>
-            <a:r>
-              <a:rPr lang="nl-BE" sz="2400" b="0" i="0" u="none" strike="noStrike" dirty="0">
-                <a:effectLst/>
-              </a:rPr>
-              <a:t> </a:t>
-            </a:r>
-          </a:p>
-          <a:p>
-            <a:pPr marL="457200" indent="-457200" algn="l">
-              <a:buFont typeface="+mj-lt"/>
-              <a:buAutoNum type="arabicPeriod"/>
-            </a:pPr>
-            <a:r>
-              <a:rPr lang="nl-BE" sz="2400" b="0" i="0" u="none" strike="noStrike" dirty="0">
-                <a:effectLst/>
-              </a:rPr>
-              <a:t> Test your configuration and installation</a:t>
-            </a:r>
-          </a:p>
-          <a:p>
-            <a:pPr marL="457200" indent="-457200" algn="l">
-              <a:buFont typeface="+mj-lt"/>
-              <a:buAutoNum type="arabicPeriod"/>
-            </a:pPr>
-            <a:r>
-              <a:rPr lang="nl-BE" sz="2400" b="0" i="0" u="none" strike="noStrike" dirty="0">
-                <a:effectLst/>
-              </a:rPr>
-              <a:t> Start Jupyterlab from Anaconda</a:t>
-            </a:r>
-          </a:p>
-        </p:txBody>
-      </p:sp>
-      <p:sp>
-        <p:nvSpPr>
           <p:cNvPr id="3" name="Tekstvak 2">
             <a:extLst>
               <a:ext uri="{FF2B5EF4-FFF2-40B4-BE49-F238E27FC236}">
@@ -7340,7 +8260,7 @@
         <p:spPr>
           <a:xfrm>
             <a:off x="1276309" y="1596420"/>
-            <a:ext cx="8324330" cy="830997"/>
+            <a:ext cx="9101068" cy="2308324"/>
           </a:xfrm>
           <a:prstGeom prst="rect">
             <a:avLst/>
@@ -7348,6 +8268,77 @@
           <a:noFill/>
         </p:spPr>
         <p:txBody>
+          <a:bodyPr wrap="square" rtlCol="0">
+            <a:spAutoFit/>
+          </a:bodyPr>
+          <a:lstStyle/>
+          <a:p>
+            <a:r>
+              <a:rPr lang="nl-BE" sz="2400" b="1" dirty="0"/>
+              <a:t>Day 1</a:t>
+            </a:r>
+            <a:r>
+              <a:rPr lang="nl-BE" sz="2400" dirty="0"/>
+              <a:t>: </a:t>
+            </a:r>
+          </a:p>
+          <a:p>
+            <a:r>
+              <a:rPr lang="nl-BE" sz="2400" dirty="0"/>
+              <a:t>		- Introduction on Pandas library</a:t>
+            </a:r>
+          </a:p>
+          <a:p>
+            <a:r>
+              <a:rPr lang="nl-BE" sz="2400" dirty="0"/>
+              <a:t>		- Exercises on different aspects of data processing </a:t>
+            </a:r>
+            <a:endParaRPr lang="nl-BE" sz="2400" b="1" dirty="0"/>
+          </a:p>
+          <a:p>
+            <a:endParaRPr lang="nl-BE" sz="2400" b="1" dirty="0"/>
+          </a:p>
+          <a:p>
+            <a:r>
+              <a:rPr lang="nl-BE" sz="2400" b="1" dirty="0"/>
+              <a:t>Day 2</a:t>
+            </a:r>
+            <a:r>
+              <a:rPr lang="nl-BE" sz="2400" dirty="0"/>
+              <a:t>: </a:t>
+            </a:r>
+          </a:p>
+          <a:p>
+            <a:r>
+              <a:rPr lang="nl-BE" sz="2400" dirty="0"/>
+              <a:t>		- Use case: Solve the crime in Amsterdam!</a:t>
+            </a:r>
+          </a:p>
+        </p:txBody>
+      </p:sp>
+      <p:sp>
+        <p:nvSpPr>
+          <p:cNvPr id="7" name="Tekstvak 6">
+            <a:extLst>
+              <a:ext uri="{FF2B5EF4-FFF2-40B4-BE49-F238E27FC236}">
+                <a16:creationId xmlns:a16="http://schemas.microsoft.com/office/drawing/2014/main" id="{BAD3F48D-9FD0-22A7-131C-81E08705EBC4}"/>
+              </a:ext>
+            </a:extLst>
+          </p:cNvPr>
+          <p:cNvSpPr txBox="1"/>
+          <p:nvPr/>
+        </p:nvSpPr>
+        <p:spPr>
+          <a:xfrm>
+            <a:off x="1276309" y="4338250"/>
+            <a:ext cx="7776488" cy="1846659"/>
+          </a:xfrm>
+          <a:prstGeom prst="rect">
+            <a:avLst/>
+          </a:prstGeom>
+          <a:noFill/>
+        </p:spPr>
+        <p:txBody>
           <a:bodyPr wrap="none" rtlCol="0">
             <a:spAutoFit/>
           </a:bodyPr>
@@ -7355,21 +8346,31 @@
           <a:p>
             <a:r>
               <a:rPr lang="nl-BE" sz="2400" b="1" dirty="0"/>
-              <a:t>Day 1</a:t>
-            </a:r>
-            <a:r>
-              <a:rPr lang="nl-BE" sz="2400" dirty="0"/>
-              <a:t>: Introduction and exercises on working with pandas library</a:t>
-            </a:r>
-          </a:p>
-          <a:p>
-            <a:r>
-              <a:rPr lang="nl-BE" sz="2400" b="1" dirty="0"/>
-              <a:t>Day 2</a:t>
-            </a:r>
-            <a:r>
-              <a:rPr lang="nl-BE" sz="2400" dirty="0"/>
-              <a:t>: Use case: Solve the crime!</a:t>
+              <a:t>Time is divided between:</a:t>
+            </a:r>
+          </a:p>
+          <a:p>
+            <a:r>
+              <a:rPr lang="nl-BE" dirty="0"/>
+              <a:t>	- group sessions: explaining new concepts</a:t>
+            </a:r>
+          </a:p>
+          <a:p>
+            <a:r>
+              <a:rPr lang="nl-BE" dirty="0"/>
+              <a:t>	- practice sessions: you work on excercises </a:t>
+            </a:r>
+          </a:p>
+          <a:p>
+            <a:endParaRPr lang="nl-BE" dirty="0"/>
+          </a:p>
+          <a:p>
+            <a:endParaRPr lang="nl-BE" dirty="0"/>
+          </a:p>
+          <a:p>
+            <a:r>
+              <a:rPr lang="nl-BE" dirty="0"/>
+              <a:t>In case of questions, remarks, suggestions, you can always intterupt and just ask!</a:t>
             </a:r>
           </a:p>
         </p:txBody>

</xml_diff>